<commit_message>
rajout de la struc dans la prez
</commit_message>
<xml_diff>
--- a/Opti-CSS/Prez.pptx
+++ b/Opti-CSS/Prez.pptx
@@ -8,6 +8,7 @@
     <p:sldId id="256" r:id="rId2"/>
     <p:sldId id="257" r:id="rId3"/>
     <p:sldId id="258" r:id="rId4"/>
+    <p:sldId id="259" r:id="rId5"/>
   </p:sldIdLst>
   <p:sldSz cx="9144000" cy="6858000" type="screen4x3"/>
   <p:notesSz cx="6858000" cy="9144000"/>
@@ -4114,6 +4115,552 @@
     <p:extLst>
       <p:ext uri="{BB962C8B-B14F-4D97-AF65-F5344CB8AC3E}">
         <p14:creationId xmlns:p14="http://schemas.microsoft.com/office/powerpoint/2010/main" val="2337658551"/>
+      </p:ext>
+    </p:extLst>
+  </p:cSld>
+  <p:clrMapOvr>
+    <a:masterClrMapping/>
+  </p:clrMapOvr>
+</p:sld>
+</file>
+
+<file path=ppt/slides/slide4.xml><?xml version="1.0" encoding="utf-8"?>
+<p:sld xmlns:a="http://schemas.openxmlformats.org/drawingml/2006/main" xmlns:r="http://schemas.openxmlformats.org/officeDocument/2006/relationships" xmlns:p="http://schemas.openxmlformats.org/presentationml/2006/main">
+  <p:cSld>
+    <p:spTree>
+      <p:nvGrpSpPr>
+        <p:cNvPr id="1" name=""/>
+        <p:cNvGrpSpPr/>
+        <p:nvPr/>
+      </p:nvGrpSpPr>
+      <p:grpSpPr>
+        <a:xfrm>
+          <a:off x="0" y="0"/>
+          <a:ext cx="0" cy="0"/>
+          <a:chOff x="0" y="0"/>
+          <a:chExt cx="0" cy="0"/>
+        </a:xfrm>
+      </p:grpSpPr>
+      <p:sp>
+        <p:nvSpPr>
+          <p:cNvPr id="2" name="Titre 1"/>
+          <p:cNvSpPr>
+            <a:spLocks noGrp="1"/>
+          </p:cNvSpPr>
+          <p:nvPr>
+            <p:ph type="title"/>
+          </p:nvPr>
+        </p:nvSpPr>
+        <p:spPr/>
+        <p:txBody>
+          <a:bodyPr/>
+          <a:lstStyle/>
+          <a:p>
+            <a:r>
+              <a:rPr lang="fr-FR" dirty="0" smtClean="0"/>
+              <a:t>STRUCTURE</a:t>
+            </a:r>
+            <a:endParaRPr lang="fr-FR" dirty="0"/>
+          </a:p>
+        </p:txBody>
+      </p:sp>
+      <p:sp>
+        <p:nvSpPr>
+          <p:cNvPr id="3" name="Espace réservé du contenu 2"/>
+          <p:cNvSpPr>
+            <a:spLocks noGrp="1"/>
+          </p:cNvSpPr>
+          <p:nvPr>
+            <p:ph idx="1"/>
+          </p:nvPr>
+        </p:nvSpPr>
+        <p:spPr>
+          <a:xfrm>
+            <a:off x="611560" y="1582011"/>
+            <a:ext cx="3816424" cy="2423053"/>
+          </a:xfrm>
+        </p:spPr>
+        <p:txBody>
+          <a:bodyPr>
+            <a:normAutofit fontScale="77500" lnSpcReduction="20000"/>
+          </a:bodyPr>
+          <a:lstStyle/>
+          <a:p>
+            <a:pPr marL="0" indent="0">
+              <a:buNone/>
+            </a:pPr>
+            <a:r>
+              <a:rPr lang="fr-FR" dirty="0" err="1"/>
+              <a:t>typedef</a:t>
+            </a:r>
+            <a:r>
+              <a:rPr lang="fr-FR" dirty="0"/>
+              <a:t> </a:t>
+            </a:r>
+            <a:r>
+              <a:rPr lang="fr-FR" dirty="0" err="1"/>
+              <a:t>struct</a:t>
+            </a:r>
+            <a:r>
+              <a:rPr lang="fr-FR" dirty="0"/>
+              <a:t> </a:t>
+            </a:r>
+            <a:r>
+              <a:rPr lang="fr-FR" dirty="0" err="1"/>
+              <a:t>s_list_chain</a:t>
+            </a:r>
+            <a:r>
+              <a:rPr lang="fr-FR" dirty="0"/>
+              <a:t> {</a:t>
+            </a:r>
+          </a:p>
+          <a:p>
+            <a:pPr marL="0" indent="0">
+              <a:buNone/>
+            </a:pPr>
+            <a:r>
+              <a:rPr lang="fr-FR" dirty="0"/>
+              <a:t>    </a:t>
+            </a:r>
+            <a:r>
+              <a:rPr lang="fr-FR" dirty="0" err="1"/>
+              <a:t>const</a:t>
+            </a:r>
+            <a:r>
+              <a:rPr lang="fr-FR" dirty="0"/>
+              <a:t> char* balise;</a:t>
+            </a:r>
+          </a:p>
+          <a:p>
+            <a:pPr marL="0" indent="0">
+              <a:buNone/>
+            </a:pPr>
+            <a:r>
+              <a:rPr lang="fr-FR" dirty="0"/>
+              <a:t>    </a:t>
+            </a:r>
+            <a:r>
+              <a:rPr lang="fr-FR" dirty="0" err="1"/>
+              <a:t>struct</a:t>
+            </a:r>
+            <a:r>
+              <a:rPr lang="fr-FR" dirty="0"/>
+              <a:t> </a:t>
+            </a:r>
+            <a:r>
+              <a:rPr lang="fr-FR" dirty="0" err="1"/>
+              <a:t>s_list_node</a:t>
+            </a:r>
+            <a:r>
+              <a:rPr lang="fr-FR" dirty="0"/>
+              <a:t> * </a:t>
+            </a:r>
+            <a:r>
+              <a:rPr lang="fr-FR" dirty="0" err="1"/>
+              <a:t>node</a:t>
+            </a:r>
+            <a:r>
+              <a:rPr lang="fr-FR" dirty="0"/>
+              <a:t>;</a:t>
+            </a:r>
+          </a:p>
+          <a:p>
+            <a:pPr marL="0" indent="0">
+              <a:buNone/>
+            </a:pPr>
+            <a:r>
+              <a:rPr lang="fr-FR" dirty="0"/>
+              <a:t>    </a:t>
+            </a:r>
+            <a:r>
+              <a:rPr lang="fr-FR" dirty="0" err="1"/>
+              <a:t>struct</a:t>
+            </a:r>
+            <a:r>
+              <a:rPr lang="fr-FR" dirty="0"/>
+              <a:t> </a:t>
+            </a:r>
+            <a:r>
+              <a:rPr lang="fr-FR" dirty="0" err="1"/>
+              <a:t>s_list_chain</a:t>
+            </a:r>
+            <a:r>
+              <a:rPr lang="fr-FR" dirty="0"/>
+              <a:t> * </a:t>
+            </a:r>
+            <a:r>
+              <a:rPr lang="fr-FR" dirty="0" err="1"/>
+              <a:t>next</a:t>
+            </a:r>
+            <a:r>
+              <a:rPr lang="fr-FR" dirty="0"/>
+              <a:t>;</a:t>
+            </a:r>
+          </a:p>
+          <a:p>
+            <a:pPr marL="0" indent="0">
+              <a:buNone/>
+            </a:pPr>
+            <a:r>
+              <a:rPr lang="fr-FR" dirty="0"/>
+              <a:t>}</a:t>
+            </a:r>
+            <a:r>
+              <a:rPr lang="fr-FR" dirty="0" err="1"/>
+              <a:t>t_list_chain</a:t>
+            </a:r>
+            <a:r>
+              <a:rPr lang="fr-FR" dirty="0"/>
+              <a:t>;</a:t>
+            </a:r>
+          </a:p>
+          <a:p>
+            <a:pPr marL="0" indent="0">
+              <a:buNone/>
+            </a:pPr>
+            <a:endParaRPr lang="fr-FR" dirty="0" smtClean="0"/>
+          </a:p>
+          <a:p>
+            <a:pPr marL="0" indent="0">
+              <a:buNone/>
+            </a:pPr>
+            <a:endParaRPr lang="fr-FR" dirty="0"/>
+          </a:p>
+        </p:txBody>
+      </p:sp>
+      <p:sp>
+        <p:nvSpPr>
+          <p:cNvPr id="4" name="Espace réservé du contenu 2"/>
+          <p:cNvSpPr txBox="1">
+            <a:spLocks/>
+          </p:cNvSpPr>
+          <p:nvPr/>
+        </p:nvSpPr>
+        <p:spPr>
+          <a:xfrm>
+            <a:off x="4499992" y="3284984"/>
+            <a:ext cx="4104456" cy="3137595"/>
+          </a:xfrm>
+          <a:prstGeom prst="rect">
+            <a:avLst/>
+          </a:prstGeom>
+        </p:spPr>
+        <p:txBody>
+          <a:bodyPr vert="horz" lIns="91440" tIns="45720" rIns="91440" bIns="45720" rtlCol="0">
+            <a:normAutofit fontScale="85000" lnSpcReduction="10000"/>
+          </a:bodyPr>
+          <a:lstStyle>
+            <a:lvl1pPr marL="342900" indent="-342900" algn="l" defTabSz="914400" rtl="0" eaLnBrk="1" latinLnBrk="0" hangingPunct="1">
+              <a:spcBef>
+                <a:spcPct val="20000"/>
+              </a:spcBef>
+              <a:buFont typeface="Arial" panose="020B0604020202020204" pitchFamily="34" charset="0"/>
+              <a:buChar char="•"/>
+              <a:defRPr sz="3200" kern="1200">
+                <a:solidFill>
+                  <a:schemeClr val="tx1"/>
+                </a:solidFill>
+                <a:latin typeface="+mn-lt"/>
+                <a:ea typeface="+mn-ea"/>
+                <a:cs typeface="+mn-cs"/>
+              </a:defRPr>
+            </a:lvl1pPr>
+            <a:lvl2pPr marL="742950" indent="-285750" algn="l" defTabSz="914400" rtl="0" eaLnBrk="1" latinLnBrk="0" hangingPunct="1">
+              <a:spcBef>
+                <a:spcPct val="20000"/>
+              </a:spcBef>
+              <a:buFont typeface="Arial" panose="020B0604020202020204" pitchFamily="34" charset="0"/>
+              <a:buChar char="–"/>
+              <a:defRPr sz="2800" kern="1200">
+                <a:solidFill>
+                  <a:schemeClr val="tx1"/>
+                </a:solidFill>
+                <a:latin typeface="+mn-lt"/>
+                <a:ea typeface="+mn-ea"/>
+                <a:cs typeface="+mn-cs"/>
+              </a:defRPr>
+            </a:lvl2pPr>
+            <a:lvl3pPr marL="1143000" indent="-228600" algn="l" defTabSz="914400" rtl="0" eaLnBrk="1" latinLnBrk="0" hangingPunct="1">
+              <a:spcBef>
+                <a:spcPct val="20000"/>
+              </a:spcBef>
+              <a:buFont typeface="Arial" panose="020B0604020202020204" pitchFamily="34" charset="0"/>
+              <a:buChar char="•"/>
+              <a:defRPr sz="2400" kern="1200">
+                <a:solidFill>
+                  <a:schemeClr val="tx1"/>
+                </a:solidFill>
+                <a:latin typeface="+mn-lt"/>
+                <a:ea typeface="+mn-ea"/>
+                <a:cs typeface="+mn-cs"/>
+              </a:defRPr>
+            </a:lvl3pPr>
+            <a:lvl4pPr marL="1600200" indent="-228600" algn="l" defTabSz="914400" rtl="0" eaLnBrk="1" latinLnBrk="0" hangingPunct="1">
+              <a:spcBef>
+                <a:spcPct val="20000"/>
+              </a:spcBef>
+              <a:buFont typeface="Arial" panose="020B0604020202020204" pitchFamily="34" charset="0"/>
+              <a:buChar char="–"/>
+              <a:defRPr sz="2000" kern="1200">
+                <a:solidFill>
+                  <a:schemeClr val="tx1"/>
+                </a:solidFill>
+                <a:latin typeface="+mn-lt"/>
+                <a:ea typeface="+mn-ea"/>
+                <a:cs typeface="+mn-cs"/>
+              </a:defRPr>
+            </a:lvl4pPr>
+            <a:lvl5pPr marL="2057400" indent="-228600" algn="l" defTabSz="914400" rtl="0" eaLnBrk="1" latinLnBrk="0" hangingPunct="1">
+              <a:spcBef>
+                <a:spcPct val="20000"/>
+              </a:spcBef>
+              <a:buFont typeface="Arial" panose="020B0604020202020204" pitchFamily="34" charset="0"/>
+              <a:buChar char="»"/>
+              <a:defRPr sz="2000" kern="1200">
+                <a:solidFill>
+                  <a:schemeClr val="tx1"/>
+                </a:solidFill>
+                <a:latin typeface="+mn-lt"/>
+                <a:ea typeface="+mn-ea"/>
+                <a:cs typeface="+mn-cs"/>
+              </a:defRPr>
+            </a:lvl5pPr>
+            <a:lvl6pPr marL="2514600" indent="-228600" algn="l" defTabSz="914400" rtl="0" eaLnBrk="1" latinLnBrk="0" hangingPunct="1">
+              <a:spcBef>
+                <a:spcPct val="20000"/>
+              </a:spcBef>
+              <a:buFont typeface="Arial" panose="020B0604020202020204" pitchFamily="34" charset="0"/>
+              <a:buChar char="•"/>
+              <a:defRPr sz="2000" kern="1200">
+                <a:solidFill>
+                  <a:schemeClr val="tx1"/>
+                </a:solidFill>
+                <a:latin typeface="+mn-lt"/>
+                <a:ea typeface="+mn-ea"/>
+                <a:cs typeface="+mn-cs"/>
+              </a:defRPr>
+            </a:lvl6pPr>
+            <a:lvl7pPr marL="2971800" indent="-228600" algn="l" defTabSz="914400" rtl="0" eaLnBrk="1" latinLnBrk="0" hangingPunct="1">
+              <a:spcBef>
+                <a:spcPct val="20000"/>
+              </a:spcBef>
+              <a:buFont typeface="Arial" panose="020B0604020202020204" pitchFamily="34" charset="0"/>
+              <a:buChar char="•"/>
+              <a:defRPr sz="2000" kern="1200">
+                <a:solidFill>
+                  <a:schemeClr val="tx1"/>
+                </a:solidFill>
+                <a:latin typeface="+mn-lt"/>
+                <a:ea typeface="+mn-ea"/>
+                <a:cs typeface="+mn-cs"/>
+              </a:defRPr>
+            </a:lvl7pPr>
+            <a:lvl8pPr marL="3429000" indent="-228600" algn="l" defTabSz="914400" rtl="0" eaLnBrk="1" latinLnBrk="0" hangingPunct="1">
+              <a:spcBef>
+                <a:spcPct val="20000"/>
+              </a:spcBef>
+              <a:buFont typeface="Arial" panose="020B0604020202020204" pitchFamily="34" charset="0"/>
+              <a:buChar char="•"/>
+              <a:defRPr sz="2000" kern="1200">
+                <a:solidFill>
+                  <a:schemeClr val="tx1"/>
+                </a:solidFill>
+                <a:latin typeface="+mn-lt"/>
+                <a:ea typeface="+mn-ea"/>
+                <a:cs typeface="+mn-cs"/>
+              </a:defRPr>
+            </a:lvl8pPr>
+            <a:lvl9pPr marL="3886200" indent="-228600" algn="l" defTabSz="914400" rtl="0" eaLnBrk="1" latinLnBrk="0" hangingPunct="1">
+              <a:spcBef>
+                <a:spcPct val="20000"/>
+              </a:spcBef>
+              <a:buFont typeface="Arial" panose="020B0604020202020204" pitchFamily="34" charset="0"/>
+              <a:buChar char="•"/>
+              <a:defRPr sz="2000" kern="1200">
+                <a:solidFill>
+                  <a:schemeClr val="tx1"/>
+                </a:solidFill>
+                <a:latin typeface="+mn-lt"/>
+                <a:ea typeface="+mn-ea"/>
+                <a:cs typeface="+mn-cs"/>
+              </a:defRPr>
+            </a:lvl9pPr>
+          </a:lstStyle>
+          <a:p>
+            <a:pPr marL="0" indent="0">
+              <a:buFont typeface="Arial" panose="020B0604020202020204" pitchFamily="34" charset="0"/>
+              <a:buNone/>
+            </a:pPr>
+            <a:endParaRPr lang="fr-FR" dirty="0" smtClean="0"/>
+          </a:p>
+          <a:p>
+            <a:pPr marL="0" indent="0">
+              <a:buFont typeface="Arial" panose="020B0604020202020204" pitchFamily="34" charset="0"/>
+              <a:buNone/>
+            </a:pPr>
+            <a:r>
+              <a:rPr lang="fr-FR" dirty="0" err="1" smtClean="0"/>
+              <a:t>typedef</a:t>
+            </a:r>
+            <a:r>
+              <a:rPr lang="fr-FR" dirty="0" smtClean="0"/>
+              <a:t> </a:t>
+            </a:r>
+            <a:r>
+              <a:rPr lang="fr-FR" dirty="0" err="1" smtClean="0"/>
+              <a:t>struct</a:t>
+            </a:r>
+            <a:r>
+              <a:rPr lang="fr-FR" dirty="0" smtClean="0"/>
+              <a:t> </a:t>
+            </a:r>
+            <a:r>
+              <a:rPr lang="fr-FR" dirty="0" err="1" smtClean="0"/>
+              <a:t>s_list_node</a:t>
+            </a:r>
+            <a:r>
+              <a:rPr lang="fr-FR" dirty="0" smtClean="0"/>
+              <a:t> {</a:t>
+            </a:r>
+          </a:p>
+          <a:p>
+            <a:pPr marL="0" indent="0">
+              <a:buFont typeface="Arial" panose="020B0604020202020204" pitchFamily="34" charset="0"/>
+              <a:buNone/>
+            </a:pPr>
+            <a:r>
+              <a:rPr lang="fr-FR" dirty="0" smtClean="0"/>
+              <a:t>    </a:t>
+            </a:r>
+            <a:r>
+              <a:rPr lang="fr-FR" dirty="0" err="1" smtClean="0"/>
+              <a:t>const</a:t>
+            </a:r>
+            <a:r>
+              <a:rPr lang="fr-FR" dirty="0" smtClean="0"/>
+              <a:t> char * </a:t>
+            </a:r>
+            <a:r>
+              <a:rPr lang="fr-FR" dirty="0" err="1" smtClean="0"/>
+              <a:t>property</a:t>
+            </a:r>
+            <a:r>
+              <a:rPr lang="fr-FR" dirty="0" smtClean="0"/>
+              <a:t>;</a:t>
+            </a:r>
+          </a:p>
+          <a:p>
+            <a:pPr marL="0" indent="0">
+              <a:buFont typeface="Arial" panose="020B0604020202020204" pitchFamily="34" charset="0"/>
+              <a:buNone/>
+            </a:pPr>
+            <a:r>
+              <a:rPr lang="fr-FR" dirty="0" smtClean="0"/>
+              <a:t>    </a:t>
+            </a:r>
+            <a:r>
+              <a:rPr lang="fr-FR" dirty="0" err="1" smtClean="0"/>
+              <a:t>const</a:t>
+            </a:r>
+            <a:r>
+              <a:rPr lang="fr-FR" dirty="0" smtClean="0"/>
+              <a:t> char * value;</a:t>
+            </a:r>
+          </a:p>
+          <a:p>
+            <a:pPr marL="0" indent="0">
+              <a:buFont typeface="Arial" panose="020B0604020202020204" pitchFamily="34" charset="0"/>
+              <a:buNone/>
+            </a:pPr>
+            <a:r>
+              <a:rPr lang="fr-FR" dirty="0" smtClean="0"/>
+              <a:t>    </a:t>
+            </a:r>
+            <a:r>
+              <a:rPr lang="fr-FR" dirty="0" err="1" smtClean="0"/>
+              <a:t>struct</a:t>
+            </a:r>
+            <a:r>
+              <a:rPr lang="fr-FR" dirty="0" smtClean="0"/>
+              <a:t> </a:t>
+            </a:r>
+            <a:r>
+              <a:rPr lang="fr-FR" dirty="0" err="1" smtClean="0"/>
+              <a:t>s_list_node</a:t>
+            </a:r>
+            <a:r>
+              <a:rPr lang="fr-FR" dirty="0" smtClean="0"/>
+              <a:t> * </a:t>
+            </a:r>
+            <a:r>
+              <a:rPr lang="fr-FR" dirty="0" err="1" smtClean="0"/>
+              <a:t>next</a:t>
+            </a:r>
+            <a:r>
+              <a:rPr lang="fr-FR" dirty="0" smtClean="0"/>
+              <a:t>;</a:t>
+            </a:r>
+          </a:p>
+          <a:p>
+            <a:pPr marL="0" indent="0">
+              <a:buFont typeface="Arial" panose="020B0604020202020204" pitchFamily="34" charset="0"/>
+              <a:buNone/>
+            </a:pPr>
+            <a:r>
+              <a:rPr lang="fr-FR" dirty="0" smtClean="0"/>
+              <a:t>}</a:t>
+            </a:r>
+            <a:r>
+              <a:rPr lang="fr-FR" dirty="0" err="1" smtClean="0"/>
+              <a:t>t_list_node</a:t>
+            </a:r>
+            <a:r>
+              <a:rPr lang="fr-FR" dirty="0" smtClean="0"/>
+              <a:t>;</a:t>
+            </a:r>
+            <a:endParaRPr lang="fr-FR" dirty="0"/>
+          </a:p>
+        </p:txBody>
+      </p:sp>
+      <p:cxnSp>
+        <p:nvCxnSpPr>
+          <p:cNvPr id="6" name="Connecteur en arc 5"/>
+          <p:cNvCxnSpPr>
+            <a:endCxn id="4" idx="0"/>
+          </p:cNvCxnSpPr>
+          <p:nvPr/>
+        </p:nvCxnSpPr>
+        <p:spPr>
+          <a:xfrm>
+            <a:off x="4499992" y="2564904"/>
+            <a:ext cx="2052228" cy="720080"/>
+          </a:xfrm>
+          <a:prstGeom prst="curvedConnector2">
+            <a:avLst/>
+          </a:prstGeom>
+          <a:ln>
+            <a:tailEnd type="arrow"/>
+          </a:ln>
+        </p:spPr>
+        <p:style>
+          <a:lnRef idx="2">
+            <a:schemeClr val="accent1"/>
+          </a:lnRef>
+          <a:fillRef idx="0">
+            <a:schemeClr val="accent1"/>
+          </a:fillRef>
+          <a:effectRef idx="1">
+            <a:schemeClr val="accent1"/>
+          </a:effectRef>
+          <a:fontRef idx="minor">
+            <a:schemeClr val="tx1"/>
+          </a:fontRef>
+        </p:style>
+      </p:cxnSp>
+    </p:spTree>
+    <p:extLst>
+      <p:ext uri="{BB962C8B-B14F-4D97-AF65-F5344CB8AC3E}">
+        <p14:creationId xmlns:p14="http://schemas.microsoft.com/office/powerpoint/2010/main" val="2113446357"/>
       </p:ext>
     </p:extLst>
   </p:cSld>

</xml_diff>